<commit_message>
Neural Machine Translation with Attention: checkpointing before implementation details
</commit_message>
<xml_diff>
--- a/operating_system/ghOSt/Shenango.pptx
+++ b/operating_system/ghOSt/Shenango.pptx
@@ -270,7 +270,7 @@
           <a:lstStyle/>
           <a:p>
             <a:fld id="{6E8E4B53-7435-8848-A9A4-3916BC481BB9}" type="datetimeFigureOut">
-              <a:t>2023. 12. 29.</a:t>
+              <a:t>2023. 12. 30.</a:t>
             </a:fld>
             <a:endParaRPr kumimoji="1" lang="ko-Kore-KR" altLang="en-US"/>
           </a:p>
@@ -438,7 +438,7 @@
           <a:lstStyle/>
           <a:p>
             <a:fld id="{6E8E4B53-7435-8848-A9A4-3916BC481BB9}" type="datetimeFigureOut">
-              <a:t>2023. 12. 29.</a:t>
+              <a:t>2023. 12. 30.</a:t>
             </a:fld>
             <a:endParaRPr kumimoji="1" lang="ko-Kore-KR" altLang="en-US"/>
           </a:p>
@@ -616,7 +616,7 @@
           <a:lstStyle/>
           <a:p>
             <a:fld id="{6E8E4B53-7435-8848-A9A4-3916BC481BB9}" type="datetimeFigureOut">
-              <a:t>2023. 12. 29.</a:t>
+              <a:t>2023. 12. 30.</a:t>
             </a:fld>
             <a:endParaRPr kumimoji="1" lang="ko-Kore-KR" altLang="en-US"/>
           </a:p>
@@ -784,7 +784,7 @@
           <a:lstStyle/>
           <a:p>
             <a:fld id="{6E8E4B53-7435-8848-A9A4-3916BC481BB9}" type="datetimeFigureOut">
-              <a:t>2023. 12. 29.</a:t>
+              <a:t>2023. 12. 30.</a:t>
             </a:fld>
             <a:endParaRPr kumimoji="1" lang="ko-Kore-KR" altLang="en-US"/>
           </a:p>
@@ -1028,7 +1028,7 @@
           <a:lstStyle/>
           <a:p>
             <a:fld id="{6E8E4B53-7435-8848-A9A4-3916BC481BB9}" type="datetimeFigureOut">
-              <a:t>2023. 12. 29.</a:t>
+              <a:t>2023. 12. 30.</a:t>
             </a:fld>
             <a:endParaRPr kumimoji="1" lang="ko-Kore-KR" altLang="en-US"/>
           </a:p>
@@ -1258,7 +1258,7 @@
           <a:lstStyle/>
           <a:p>
             <a:fld id="{6E8E4B53-7435-8848-A9A4-3916BC481BB9}" type="datetimeFigureOut">
-              <a:t>2023. 12. 29.</a:t>
+              <a:t>2023. 12. 30.</a:t>
             </a:fld>
             <a:endParaRPr kumimoji="1" lang="ko-Kore-KR" altLang="en-US"/>
           </a:p>
@@ -1623,7 +1623,7 @@
           <a:lstStyle/>
           <a:p>
             <a:fld id="{6E8E4B53-7435-8848-A9A4-3916BC481BB9}" type="datetimeFigureOut">
-              <a:t>2023. 12. 29.</a:t>
+              <a:t>2023. 12. 30.</a:t>
             </a:fld>
             <a:endParaRPr kumimoji="1" lang="ko-Kore-KR" altLang="en-US"/>
           </a:p>
@@ -1739,7 +1739,7 @@
           <a:lstStyle/>
           <a:p>
             <a:fld id="{6E8E4B53-7435-8848-A9A4-3916BC481BB9}" type="datetimeFigureOut">
-              <a:t>2023. 12. 29.</a:t>
+              <a:t>2023. 12. 30.</a:t>
             </a:fld>
             <a:endParaRPr kumimoji="1" lang="ko-Kore-KR" altLang="en-US"/>
           </a:p>
@@ -1832,7 +1832,7 @@
           <a:lstStyle/>
           <a:p>
             <a:fld id="{6E8E4B53-7435-8848-A9A4-3916BC481BB9}" type="datetimeFigureOut">
-              <a:t>2023. 12. 29.</a:t>
+              <a:t>2023. 12. 30.</a:t>
             </a:fld>
             <a:endParaRPr kumimoji="1" lang="ko-Kore-KR" altLang="en-US"/>
           </a:p>
@@ -2107,7 +2107,7 @@
           <a:lstStyle/>
           <a:p>
             <a:fld id="{6E8E4B53-7435-8848-A9A4-3916BC481BB9}" type="datetimeFigureOut">
-              <a:t>2023. 12. 29.</a:t>
+              <a:t>2023. 12. 30.</a:t>
             </a:fld>
             <a:endParaRPr kumimoji="1" lang="ko-Kore-KR" altLang="en-US"/>
           </a:p>
@@ -2362,7 +2362,7 @@
           <a:lstStyle/>
           <a:p>
             <a:fld id="{6E8E4B53-7435-8848-A9A4-3916BC481BB9}" type="datetimeFigureOut">
-              <a:t>2023. 12. 29.</a:t>
+              <a:t>2023. 12. 30.</a:t>
             </a:fld>
             <a:endParaRPr kumimoji="1" lang="ko-Kore-KR" altLang="en-US"/>
           </a:p>
@@ -2573,7 +2573,7 @@
           </a:lstStyle>
           <a:p>
             <a:fld id="{6E8E4B53-7435-8848-A9A4-3916BC481BB9}" type="datetimeFigureOut">
-              <a:t>2023. 12. 29.</a:t>
+              <a:t>2023. 12. 30.</a:t>
             </a:fld>
             <a:endParaRPr kumimoji="1" lang="ko-Kore-KR" altLang="en-US"/>
           </a:p>
@@ -39462,7 +39462,7 @@
             <a:pPr algn="ctr"/>
             <a:r>
               <a:rPr kumimoji="1" lang="en-US" altLang="ko-Kore-KR" sz="3200"/>
-              <a:t>What can be futher?</a:t>
+              <a:t>What can be further?</a:t>
             </a:r>
             <a:endParaRPr kumimoji="1" lang="ko-Kore-KR" altLang="en-US" sz="3200"/>
           </a:p>
@@ -42359,7 +42359,7 @@
             <a:pPr algn="ctr"/>
             <a:r>
               <a:rPr kumimoji="1" lang="en-US" altLang="ko-Kore-KR" sz="3200"/>
-              <a:t>What can be futher?</a:t>
+              <a:t>What can be further?</a:t>
             </a:r>
             <a:endParaRPr kumimoji="1" lang="ko-Kore-KR" altLang="en-US" sz="3200"/>
           </a:p>
@@ -45528,7 +45528,7 @@
             <a:pPr algn="ctr"/>
             <a:r>
               <a:rPr kumimoji="1" lang="en-US" altLang="ko-Kore-KR" sz="3200"/>
-              <a:t>What can be futher?</a:t>
+              <a:t>What can be further?</a:t>
             </a:r>
             <a:endParaRPr kumimoji="1" lang="ko-Kore-KR" altLang="en-US" sz="3200"/>
           </a:p>
@@ -48697,7 +48697,7 @@
             <a:pPr algn="ctr"/>
             <a:r>
               <a:rPr kumimoji="1" lang="en-US" altLang="ko-Kore-KR" sz="3200"/>
-              <a:t>What can be futher?</a:t>
+              <a:t>What can be further?</a:t>
             </a:r>
             <a:endParaRPr kumimoji="1" lang="ko-Kore-KR" altLang="en-US" sz="3200"/>
           </a:p>

</xml_diff>